<commit_message>
updated log.txt and parse_log.m; add README for running web server
</commit_message>
<xml_diff>
--- a/poster/result_analysis_cont.pptx
+++ b/poster/result_analysis_cont.pptx
@@ -3503,13 +3503,13 @@
       </p:sp>
       <p:pic>
         <p:nvPicPr>
-          <p:cNvPr id="5" name="Picture 4" descr="Screen Shot 2014-05-01 at 11.32.27 AM.png"/>
+          <p:cNvPr id="6" name="Picture 5" descr="Screen Shot 2014-05-01 at 12.41.12 PM.png"/>
           <p:cNvPicPr>
             <a:picLocks noChangeAspect="1"/>
           </p:cNvPicPr>
           <p:nvPr/>
         </p:nvPicPr>
-        <p:blipFill rotWithShape="1">
+        <p:blipFill>
           <a:blip r:embed="rId2">
             <a:extLst>
               <a:ext uri="{28A0092B-C50C-407E-A947-70E740481C1C}">
@@ -3517,13 +3517,14 @@
               </a:ext>
             </a:extLst>
           </a:blip>
-          <a:srcRect l="4914" t="3443"/>
-          <a:stretch/>
+          <a:stretch>
+            <a:fillRect/>
+          </a:stretch>
         </p:blipFill>
         <p:spPr>
           <a:xfrm>
-            <a:off x="273538" y="1137549"/>
-            <a:ext cx="8694615" cy="5470769"/>
+            <a:off x="883138" y="942164"/>
+            <a:ext cx="7772400" cy="5501699"/>
           </a:xfrm>
           <a:prstGeom prst="rect">
             <a:avLst/>

</xml_diff>